<commit_message>
Clean up obsolete files
</commit_message>
<xml_diff>
--- a/Formation/Formation Bourse.pptx
+++ b/Formation/Formation Bourse.pptx
@@ -9,11 +9,14 @@
     <p:sldId id="257" r:id="rId3"/>
     <p:sldId id="258" r:id="rId4"/>
     <p:sldId id="261" r:id="rId5"/>
-    <p:sldId id="264" r:id="rId6"/>
-    <p:sldId id="260" r:id="rId7"/>
-    <p:sldId id="259" r:id="rId8"/>
-    <p:sldId id="263" r:id="rId9"/>
-    <p:sldId id="262" r:id="rId10"/>
+    <p:sldId id="267" r:id="rId6"/>
+    <p:sldId id="264" r:id="rId7"/>
+    <p:sldId id="260" r:id="rId8"/>
+    <p:sldId id="259" r:id="rId9"/>
+    <p:sldId id="263" r:id="rId10"/>
+    <p:sldId id="265" r:id="rId11"/>
+    <p:sldId id="266" r:id="rId12"/>
+    <p:sldId id="262" r:id="rId13"/>
   </p:sldIdLst>
   <p:sldSz cx="12192000" cy="6858000"/>
   <p:notesSz cx="6858000" cy="9144000"/>
@@ -112,6 +115,31 @@
       </a:defRPr>
     </a:lvl9pPr>
   </p:defaultTextStyle>
+  <p:extLst>
+    <p:ext uri="{521415D9-36F7-43E2-AB2F-B90AF26B5E84}">
+      <p14:sectionLst xmlns:p14="http://schemas.microsoft.com/office/powerpoint/2010/main">
+        <p14:section name="Default Section" id="{9C49FFC2-86EC-4274-883D-3EDC37DD92B7}">
+          <p14:sldIdLst>
+            <p14:sldId id="256"/>
+            <p14:sldId id="257"/>
+            <p14:sldId id="258"/>
+            <p14:sldId id="261"/>
+            <p14:sldId id="267"/>
+            <p14:sldId id="264"/>
+            <p14:sldId id="260"/>
+            <p14:sldId id="259"/>
+            <p14:sldId id="263"/>
+            <p14:sldId id="265"/>
+            <p14:sldId id="266"/>
+            <p14:sldId id="262"/>
+          </p14:sldIdLst>
+        </p14:section>
+      </p14:sectionLst>
+    </p:ext>
+    <p:ext uri="{EFAFB233-063F-42B5-8137-9DF3F51BA10A}">
+      <p15:sldGuideLst xmlns:p15="http://schemas.microsoft.com/office/powerpoint/2012/main"/>
+    </p:ext>
+  </p:extLst>
 </p:presentation>
 </file>
 
@@ -262,7 +290,7 @@
           <a:p>
             <a:fld id="{17B49B2E-EC6C-4037-9ACB-43BC4863C7EA}" type="datetimeFigureOut">
               <a:rPr lang="en-US" smtClean="0"/>
-              <a:t>4/14/2020</a:t>
+              <a:t>4/19/2020</a:t>
             </a:fld>
             <a:endParaRPr lang="en-US"/>
           </a:p>
@@ -460,7 +488,7 @@
           <a:p>
             <a:fld id="{17B49B2E-EC6C-4037-9ACB-43BC4863C7EA}" type="datetimeFigureOut">
               <a:rPr lang="en-US" smtClean="0"/>
-              <a:t>4/14/2020</a:t>
+              <a:t>4/19/2020</a:t>
             </a:fld>
             <a:endParaRPr lang="en-US"/>
           </a:p>
@@ -668,7 +696,7 @@
           <a:p>
             <a:fld id="{17B49B2E-EC6C-4037-9ACB-43BC4863C7EA}" type="datetimeFigureOut">
               <a:rPr lang="en-US" smtClean="0"/>
-              <a:t>4/14/2020</a:t>
+              <a:t>4/19/2020</a:t>
             </a:fld>
             <a:endParaRPr lang="en-US"/>
           </a:p>
@@ -866,7 +894,7 @@
           <a:p>
             <a:fld id="{17B49B2E-EC6C-4037-9ACB-43BC4863C7EA}" type="datetimeFigureOut">
               <a:rPr lang="en-US" smtClean="0"/>
-              <a:t>4/14/2020</a:t>
+              <a:t>4/19/2020</a:t>
             </a:fld>
             <a:endParaRPr lang="en-US"/>
           </a:p>
@@ -1141,7 +1169,7 @@
           <a:p>
             <a:fld id="{17B49B2E-EC6C-4037-9ACB-43BC4863C7EA}" type="datetimeFigureOut">
               <a:rPr lang="en-US" smtClean="0"/>
-              <a:t>4/14/2020</a:t>
+              <a:t>4/19/2020</a:t>
             </a:fld>
             <a:endParaRPr lang="en-US"/>
           </a:p>
@@ -1406,7 +1434,7 @@
           <a:p>
             <a:fld id="{17B49B2E-EC6C-4037-9ACB-43BC4863C7EA}" type="datetimeFigureOut">
               <a:rPr lang="en-US" smtClean="0"/>
-              <a:t>4/14/2020</a:t>
+              <a:t>4/19/2020</a:t>
             </a:fld>
             <a:endParaRPr lang="en-US"/>
           </a:p>
@@ -1818,7 +1846,7 @@
           <a:p>
             <a:fld id="{17B49B2E-EC6C-4037-9ACB-43BC4863C7EA}" type="datetimeFigureOut">
               <a:rPr lang="en-US" smtClean="0"/>
-              <a:t>4/14/2020</a:t>
+              <a:t>4/19/2020</a:t>
             </a:fld>
             <a:endParaRPr lang="en-US"/>
           </a:p>
@@ -1959,7 +1987,7 @@
           <a:p>
             <a:fld id="{17B49B2E-EC6C-4037-9ACB-43BC4863C7EA}" type="datetimeFigureOut">
               <a:rPr lang="en-US" smtClean="0"/>
-              <a:t>4/14/2020</a:t>
+              <a:t>4/19/2020</a:t>
             </a:fld>
             <a:endParaRPr lang="en-US"/>
           </a:p>
@@ -2072,7 +2100,7 @@
           <a:p>
             <a:fld id="{17B49B2E-EC6C-4037-9ACB-43BC4863C7EA}" type="datetimeFigureOut">
               <a:rPr lang="en-US" smtClean="0"/>
-              <a:t>4/14/2020</a:t>
+              <a:t>4/19/2020</a:t>
             </a:fld>
             <a:endParaRPr lang="en-US"/>
           </a:p>
@@ -2383,7 +2411,7 @@
           <a:p>
             <a:fld id="{17B49B2E-EC6C-4037-9ACB-43BC4863C7EA}" type="datetimeFigureOut">
               <a:rPr lang="en-US" smtClean="0"/>
-              <a:t>4/14/2020</a:t>
+              <a:t>4/19/2020</a:t>
             </a:fld>
             <a:endParaRPr lang="en-US"/>
           </a:p>
@@ -2671,7 +2699,7 @@
           <a:p>
             <a:fld id="{17B49B2E-EC6C-4037-9ACB-43BC4863C7EA}" type="datetimeFigureOut">
               <a:rPr lang="en-US" smtClean="0"/>
-              <a:t>4/14/2020</a:t>
+              <a:t>4/19/2020</a:t>
             </a:fld>
             <a:endParaRPr lang="en-US"/>
           </a:p>
@@ -2912,7 +2940,7 @@
           <a:p>
             <a:fld id="{17B49B2E-EC6C-4037-9ACB-43BC4863C7EA}" type="datetimeFigureOut">
               <a:rPr lang="en-US" smtClean="0"/>
-              <a:t>4/14/2020</a:t>
+              <a:t>4/19/2020</a:t>
             </a:fld>
             <a:endParaRPr lang="en-US"/>
           </a:p>
@@ -3396,6 +3424,327 @@
 </p:sld>
 </file>
 
+<file path=ppt/slides/slide10.xml><?xml version="1.0" encoding="utf-8"?>
+<p:sld xmlns:a="http://schemas.openxmlformats.org/drawingml/2006/main" xmlns:r="http://schemas.openxmlformats.org/officeDocument/2006/relationships" xmlns:p="http://schemas.openxmlformats.org/presentationml/2006/main">
+  <p:cSld>
+    <p:spTree>
+      <p:nvGrpSpPr>
+        <p:cNvPr id="1" name=""/>
+        <p:cNvGrpSpPr/>
+        <p:nvPr/>
+      </p:nvGrpSpPr>
+      <p:grpSpPr>
+        <a:xfrm>
+          <a:off x="0" y="0"/>
+          <a:ext cx="0" cy="0"/>
+          <a:chOff x="0" y="0"/>
+          <a:chExt cx="0" cy="0"/>
+        </a:xfrm>
+      </p:grpSpPr>
+      <p:sp>
+        <p:nvSpPr>
+          <p:cNvPr id="2" name="Title 1">
+            <a:extLst>
+              <a:ext uri="{FF2B5EF4-FFF2-40B4-BE49-F238E27FC236}">
+                <a16:creationId xmlns:a16="http://schemas.microsoft.com/office/drawing/2014/main" id="{E04E3372-C95E-44C7-90FA-D8A631A63FED}"/>
+              </a:ext>
+            </a:extLst>
+          </p:cNvPr>
+          <p:cNvSpPr>
+            <a:spLocks noGrp="1"/>
+          </p:cNvSpPr>
+          <p:nvPr>
+            <p:ph type="title"/>
+          </p:nvPr>
+        </p:nvSpPr>
+        <p:spPr/>
+        <p:txBody>
+          <a:bodyPr/>
+          <a:lstStyle/>
+          <a:p>
+            <a:r>
+              <a:rPr lang="fr-FR" dirty="0"/>
+              <a:t>Construction d’un portefeuille</a:t>
+            </a:r>
+            <a:endParaRPr lang="en-US" dirty="0"/>
+          </a:p>
+        </p:txBody>
+      </p:sp>
+      <p:sp>
+        <p:nvSpPr>
+          <p:cNvPr id="3" name="Content Placeholder 2">
+            <a:extLst>
+              <a:ext uri="{FF2B5EF4-FFF2-40B4-BE49-F238E27FC236}">
+                <a16:creationId xmlns:a16="http://schemas.microsoft.com/office/drawing/2014/main" id="{ED9DB76D-9365-425E-A39F-5026367D4CBE}"/>
+              </a:ext>
+            </a:extLst>
+          </p:cNvPr>
+          <p:cNvSpPr>
+            <a:spLocks noGrp="1"/>
+          </p:cNvSpPr>
+          <p:nvPr>
+            <p:ph idx="1"/>
+          </p:nvPr>
+        </p:nvSpPr>
+        <p:spPr/>
+        <p:txBody>
+          <a:bodyPr/>
+          <a:lstStyle/>
+          <a:p>
+            <a:r>
+              <a:rPr lang="fr-FR" dirty="0"/>
+              <a:t>Diversification != All In</a:t>
+            </a:r>
+          </a:p>
+          <a:p>
+            <a:r>
+              <a:rPr lang="fr-FR" dirty="0"/>
+              <a:t>Gestion du risque</a:t>
+            </a:r>
+          </a:p>
+          <a:p>
+            <a:r>
+              <a:rPr lang="en-US" dirty="0" err="1"/>
+              <a:t>Nombre</a:t>
+            </a:r>
+            <a:r>
+              <a:rPr lang="en-US" dirty="0"/>
+              <a:t> de positions</a:t>
+            </a:r>
+          </a:p>
+        </p:txBody>
+      </p:sp>
+    </p:spTree>
+    <p:extLst>
+      <p:ext uri="{BB962C8B-B14F-4D97-AF65-F5344CB8AC3E}">
+        <p14:creationId xmlns:p14="http://schemas.microsoft.com/office/powerpoint/2010/main" val="2373413576"/>
+      </p:ext>
+    </p:extLst>
+  </p:cSld>
+  <p:clrMapOvr>
+    <a:masterClrMapping/>
+  </p:clrMapOvr>
+</p:sld>
+</file>
+
+<file path=ppt/slides/slide11.xml><?xml version="1.0" encoding="utf-8"?>
+<p:sld xmlns:a="http://schemas.openxmlformats.org/drawingml/2006/main" xmlns:r="http://schemas.openxmlformats.org/officeDocument/2006/relationships" xmlns:p="http://schemas.openxmlformats.org/presentationml/2006/main">
+  <p:cSld>
+    <p:spTree>
+      <p:nvGrpSpPr>
+        <p:cNvPr id="1" name=""/>
+        <p:cNvGrpSpPr/>
+        <p:nvPr/>
+      </p:nvGrpSpPr>
+      <p:grpSpPr>
+        <a:xfrm>
+          <a:off x="0" y="0"/>
+          <a:ext cx="0" cy="0"/>
+          <a:chOff x="0" y="0"/>
+          <a:chExt cx="0" cy="0"/>
+        </a:xfrm>
+      </p:grpSpPr>
+      <p:pic>
+        <p:nvPicPr>
+          <p:cNvPr id="1026" name="Picture 2" descr="Psychology Charts &amp; Sentiment Cycles (Updated) | Cheat sheets ...">
+            <a:extLst>
+              <a:ext uri="{FF2B5EF4-FFF2-40B4-BE49-F238E27FC236}">
+                <a16:creationId xmlns:a16="http://schemas.microsoft.com/office/drawing/2014/main" id="{BE62A6C7-3A4B-47F0-93D0-55B174085862}"/>
+              </a:ext>
+            </a:extLst>
+          </p:cNvPr>
+          <p:cNvPicPr>
+            <a:picLocks noGrp="1" noChangeAspect="1" noChangeArrowheads="1"/>
+          </p:cNvPicPr>
+          <p:nvPr>
+            <p:ph idx="1"/>
+          </p:nvPr>
+        </p:nvPicPr>
+        <p:blipFill>
+          <a:blip r:embed="rId2">
+            <a:extLst>
+              <a:ext uri="{28A0092B-C50C-407E-A947-70E740481C1C}">
+                <a14:useLocalDpi xmlns:a14="http://schemas.microsoft.com/office/drawing/2010/main" val="0"/>
+              </a:ext>
+            </a:extLst>
+          </a:blip>
+          <a:srcRect/>
+          <a:stretch>
+            <a:fillRect/>
+          </a:stretch>
+        </p:blipFill>
+        <p:spPr bwMode="auto">
+          <a:xfrm>
+            <a:off x="2821259" y="1361706"/>
+            <a:ext cx="6523463" cy="5300315"/>
+          </a:xfrm>
+          <a:prstGeom prst="rect">
+            <a:avLst/>
+          </a:prstGeom>
+          <a:noFill/>
+          <a:extLst>
+            <a:ext uri="{909E8E84-426E-40DD-AFC4-6F175D3DCCD1}">
+              <a14:hiddenFill xmlns:a14="http://schemas.microsoft.com/office/drawing/2010/main">
+                <a:solidFill>
+                  <a:srgbClr val="FFFFFF"/>
+                </a:solidFill>
+              </a14:hiddenFill>
+            </a:ext>
+          </a:extLst>
+        </p:spPr>
+      </p:pic>
+    </p:spTree>
+    <p:extLst>
+      <p:ext uri="{BB962C8B-B14F-4D97-AF65-F5344CB8AC3E}">
+        <p14:creationId xmlns:p14="http://schemas.microsoft.com/office/powerpoint/2010/main" val="725611940"/>
+      </p:ext>
+    </p:extLst>
+  </p:cSld>
+  <p:clrMapOvr>
+    <a:masterClrMapping/>
+  </p:clrMapOvr>
+</p:sld>
+</file>
+
+<file path=ppt/slides/slide12.xml><?xml version="1.0" encoding="utf-8"?>
+<p:sld xmlns:a="http://schemas.openxmlformats.org/drawingml/2006/main" xmlns:r="http://schemas.openxmlformats.org/officeDocument/2006/relationships" xmlns:p="http://schemas.openxmlformats.org/presentationml/2006/main">
+  <p:cSld>
+    <p:spTree>
+      <p:nvGrpSpPr>
+        <p:cNvPr id="1" name=""/>
+        <p:cNvGrpSpPr/>
+        <p:nvPr/>
+      </p:nvGrpSpPr>
+      <p:grpSpPr>
+        <a:xfrm>
+          <a:off x="0" y="0"/>
+          <a:ext cx="0" cy="0"/>
+          <a:chOff x="0" y="0"/>
+          <a:chExt cx="0" cy="0"/>
+        </a:xfrm>
+      </p:grpSpPr>
+      <p:sp>
+        <p:nvSpPr>
+          <p:cNvPr id="2" name="Title 1">
+            <a:extLst>
+              <a:ext uri="{FF2B5EF4-FFF2-40B4-BE49-F238E27FC236}">
+                <a16:creationId xmlns:a16="http://schemas.microsoft.com/office/drawing/2014/main" id="{8799B785-EEBE-49C4-AB80-AC77F7A85E20}"/>
+              </a:ext>
+            </a:extLst>
+          </p:cNvPr>
+          <p:cNvSpPr>
+            <a:spLocks noGrp="1"/>
+          </p:cNvSpPr>
+          <p:nvPr>
+            <p:ph type="title"/>
+          </p:nvPr>
+        </p:nvSpPr>
+        <p:spPr/>
+        <p:txBody>
+          <a:bodyPr/>
+          <a:lstStyle/>
+          <a:p>
+            <a:r>
+              <a:rPr lang="fr-FR" dirty="0"/>
+              <a:t>Psychologie</a:t>
+            </a:r>
+            <a:endParaRPr lang="en-US" dirty="0"/>
+          </a:p>
+        </p:txBody>
+      </p:sp>
+      <p:sp>
+        <p:nvSpPr>
+          <p:cNvPr id="3" name="Content Placeholder 2">
+            <a:extLst>
+              <a:ext uri="{FF2B5EF4-FFF2-40B4-BE49-F238E27FC236}">
+                <a16:creationId xmlns:a16="http://schemas.microsoft.com/office/drawing/2014/main" id="{EDA62261-4CE3-4393-9DEA-A5C83C80C12E}"/>
+              </a:ext>
+            </a:extLst>
+          </p:cNvPr>
+          <p:cNvSpPr>
+            <a:spLocks noGrp="1"/>
+          </p:cNvSpPr>
+          <p:nvPr>
+            <p:ph idx="1"/>
+          </p:nvPr>
+        </p:nvSpPr>
+        <p:spPr/>
+        <p:txBody>
+          <a:bodyPr/>
+          <a:lstStyle/>
+          <a:p>
+            <a:r>
+              <a:rPr lang="fr-FR" dirty="0"/>
+              <a:t>Couper les pertes et laisser courir les gains</a:t>
+            </a:r>
+          </a:p>
+          <a:p>
+            <a:pPr lvl="1">
+              <a:buFont typeface="Wingdings" panose="05000000000000000000" pitchFamily="2" charset="2"/>
+              <a:buChar char="è"/>
+            </a:pPr>
+            <a:r>
+              <a:rPr lang="fr-FR" dirty="0">
+                <a:sym typeface="Wingdings" panose="05000000000000000000" pitchFamily="2" charset="2"/>
+              </a:rPr>
+              <a:t>Contre la nature humaine</a:t>
+            </a:r>
+          </a:p>
+          <a:p>
+            <a:r>
+              <a:rPr lang="en-US" dirty="0"/>
+              <a:t>Ne pas </a:t>
+            </a:r>
+            <a:r>
+              <a:rPr lang="en-US" dirty="0" err="1"/>
+              <a:t>vouloir</a:t>
+            </a:r>
+            <a:r>
+              <a:rPr lang="en-US" dirty="0"/>
+              <a:t> </a:t>
+            </a:r>
+            <a:r>
+              <a:rPr lang="en-US" dirty="0" err="1"/>
+              <a:t>avoir</a:t>
+            </a:r>
+            <a:r>
+              <a:rPr lang="en-US" dirty="0"/>
+              <a:t> raison</a:t>
+            </a:r>
+          </a:p>
+          <a:p>
+            <a:pPr marL="457200" lvl="1" indent="0">
+              <a:buNone/>
+            </a:pPr>
+            <a:r>
+              <a:rPr lang="en-US" dirty="0">
+                <a:sym typeface="Wingdings" panose="05000000000000000000" pitchFamily="2" charset="2"/>
+              </a:rPr>
+              <a:t>Ranger son </a:t>
+            </a:r>
+            <a:r>
+              <a:rPr lang="en-US" dirty="0" err="1">
+                <a:sym typeface="Wingdings" panose="05000000000000000000" pitchFamily="2" charset="2"/>
+              </a:rPr>
+              <a:t>égo</a:t>
+            </a:r>
+            <a:endParaRPr lang="en-US" dirty="0"/>
+          </a:p>
+        </p:txBody>
+      </p:sp>
+    </p:spTree>
+    <p:extLst>
+      <p:ext uri="{BB962C8B-B14F-4D97-AF65-F5344CB8AC3E}">
+        <p14:creationId xmlns:p14="http://schemas.microsoft.com/office/powerpoint/2010/main" val="2971414286"/>
+      </p:ext>
+    </p:extLst>
+  </p:cSld>
+  <p:clrMapOvr>
+    <a:masterClrMapping/>
+  </p:clrMapOvr>
+</p:sld>
+</file>
+
 <file path=ppt/slides/slide2.xml><?xml version="1.0" encoding="utf-8"?>
 <p:sld xmlns:a="http://schemas.openxmlformats.org/drawingml/2006/main" xmlns:r="http://schemas.openxmlformats.org/officeDocument/2006/relationships" xmlns:p="http://schemas.openxmlformats.org/presentationml/2006/main">
   <p:cSld>
@@ -3483,27 +3832,15 @@
               <a:rPr lang="fr-FR" dirty="0">
                 <a:sym typeface="Wingdings" panose="05000000000000000000" pitchFamily="2" charset="2"/>
               </a:rPr>
-              <a:t> PEA (plus values </a:t>
-            </a:r>
-            <a:r>
-              <a:rPr lang="fr-FR" dirty="0" err="1">
-                <a:sym typeface="Wingdings" panose="05000000000000000000" pitchFamily="2" charset="2"/>
-              </a:rPr>
-              <a:t>deficalisées</a:t>
-            </a:r>
+              <a:t> PEA (plus values défiscalisées)</a:t>
+            </a:r>
+          </a:p>
+          <a:p>
             <a:r>
               <a:rPr lang="fr-FR" dirty="0">
                 <a:sym typeface="Wingdings" panose="05000000000000000000" pitchFamily="2" charset="2"/>
               </a:rPr>
-              <a:t>)</a:t>
-            </a:r>
-          </a:p>
-          <a:p>
-            <a:r>
-              <a:rPr lang="fr-FR" dirty="0">
-                <a:sym typeface="Wingdings" panose="05000000000000000000" pitchFamily="2" charset="2"/>
-              </a:rPr>
-              <a:t>Moyen Terme  Compte titre (fiscalité 30% sur plus value)</a:t>
+              <a:t>Moyen Terme  Compte titre (fiscalité 30% sur plus values)</a:t>
             </a:r>
           </a:p>
           <a:p>
@@ -3820,7 +4157,7 @@
           <a:p>
             <a:r>
               <a:rPr lang="fr-FR" dirty="0"/>
-              <a:t>Indices (CAC40, S&amp;P 500….)</a:t>
+              <a:t>Indices nationaux, sectoriel (CAC40, S&amp;P 500….)</a:t>
             </a:r>
           </a:p>
           <a:p>
@@ -3978,6 +4315,109 @@
           <p:cNvPr id="2" name="Title 1">
             <a:extLst>
               <a:ext uri="{FF2B5EF4-FFF2-40B4-BE49-F238E27FC236}">
+                <a16:creationId xmlns:a16="http://schemas.microsoft.com/office/drawing/2014/main" id="{95CE8B56-0435-468D-930C-1FC0A11A36C9}"/>
+              </a:ext>
+            </a:extLst>
+          </p:cNvPr>
+          <p:cNvSpPr>
+            <a:spLocks noGrp="1"/>
+          </p:cNvSpPr>
+          <p:nvPr>
+            <p:ph type="title"/>
+          </p:nvPr>
+        </p:nvSpPr>
+        <p:spPr/>
+        <p:txBody>
+          <a:bodyPr/>
+          <a:lstStyle/>
+          <a:p>
+            <a:r>
+              <a:rPr lang="fr-FR" dirty="0" err="1"/>
+              <a:t>Oil</a:t>
+            </a:r>
+            <a:r>
+              <a:rPr lang="fr-FR" dirty="0"/>
+              <a:t> </a:t>
+            </a:r>
+            <a:r>
+              <a:rPr lang="fr-FR" dirty="0" err="1"/>
+              <a:t>Status</a:t>
+            </a:r>
+            <a:r>
+              <a:rPr lang="fr-FR" dirty="0"/>
+              <a:t> 20/04/2020 – Roll over</a:t>
+            </a:r>
+            <a:endParaRPr lang="en-US" dirty="0"/>
+          </a:p>
+        </p:txBody>
+      </p:sp>
+      <p:pic>
+        <p:nvPicPr>
+          <p:cNvPr id="4" name="Content Placeholder 3">
+            <a:extLst>
+              <a:ext uri="{FF2B5EF4-FFF2-40B4-BE49-F238E27FC236}">
+                <a16:creationId xmlns:a16="http://schemas.microsoft.com/office/drawing/2014/main" id="{80B42E31-F4C5-42A8-BD31-CDBDF5AD32D0}"/>
+              </a:ext>
+            </a:extLst>
+          </p:cNvPr>
+          <p:cNvPicPr>
+            <a:picLocks noGrp="1" noChangeAspect="1"/>
+          </p:cNvPicPr>
+          <p:nvPr>
+            <p:ph idx="1"/>
+          </p:nvPr>
+        </p:nvPicPr>
+        <p:blipFill>
+          <a:blip r:embed="rId2"/>
+          <a:stretch>
+            <a:fillRect/>
+          </a:stretch>
+        </p:blipFill>
+        <p:spPr>
+          <a:xfrm>
+            <a:off x="1886643" y="1825621"/>
+            <a:ext cx="9601200" cy="4962525"/>
+          </a:xfrm>
+          <a:prstGeom prst="rect">
+            <a:avLst/>
+          </a:prstGeom>
+        </p:spPr>
+      </p:pic>
+    </p:spTree>
+    <p:extLst>
+      <p:ext uri="{BB962C8B-B14F-4D97-AF65-F5344CB8AC3E}">
+        <p14:creationId xmlns:p14="http://schemas.microsoft.com/office/powerpoint/2010/main" val="2932741455"/>
+      </p:ext>
+    </p:extLst>
+  </p:cSld>
+  <p:clrMapOvr>
+    <a:masterClrMapping/>
+  </p:clrMapOvr>
+</p:sld>
+</file>
+
+<file path=ppt/slides/slide6.xml><?xml version="1.0" encoding="utf-8"?>
+<p:sld xmlns:a="http://schemas.openxmlformats.org/drawingml/2006/main" xmlns:r="http://schemas.openxmlformats.org/officeDocument/2006/relationships" xmlns:p="http://schemas.openxmlformats.org/presentationml/2006/main">
+  <p:cSld>
+    <p:spTree>
+      <p:nvGrpSpPr>
+        <p:cNvPr id="1" name=""/>
+        <p:cNvGrpSpPr/>
+        <p:nvPr/>
+      </p:nvGrpSpPr>
+      <p:grpSpPr>
+        <a:xfrm>
+          <a:off x="0" y="0"/>
+          <a:ext cx="0" cy="0"/>
+          <a:chOff x="0" y="0"/>
+          <a:chExt cx="0" cy="0"/>
+        </a:xfrm>
+      </p:grpSpPr>
+      <p:sp>
+        <p:nvSpPr>
+          <p:cNvPr id="2" name="Title 1">
+            <a:extLst>
+              <a:ext uri="{FF2B5EF4-FFF2-40B4-BE49-F238E27FC236}">
                 <a16:creationId xmlns:a16="http://schemas.microsoft.com/office/drawing/2014/main" id="{0174C7E8-0AD8-46BF-AE72-3EC502D53944}"/>
               </a:ext>
             </a:extLst>
@@ -4040,7 +4480,7 @@
 </p:sld>
 </file>
 
-<file path=ppt/slides/slide6.xml><?xml version="1.0" encoding="utf-8"?>
+<file path=ppt/slides/slide7.xml><?xml version="1.0" encoding="utf-8"?>
 <p:sld xmlns:a="http://schemas.openxmlformats.org/drawingml/2006/main" xmlns:r="http://schemas.openxmlformats.org/officeDocument/2006/relationships" xmlns:p="http://schemas.openxmlformats.org/presentationml/2006/main">
   <p:cSld>
     <p:spTree>
@@ -4341,7 +4781,7 @@
 </p:sld>
 </file>
 
-<file path=ppt/slides/slide7.xml><?xml version="1.0" encoding="utf-8"?>
+<file path=ppt/slides/slide8.xml><?xml version="1.0" encoding="utf-8"?>
 <p:sld xmlns:a="http://schemas.openxmlformats.org/drawingml/2006/main" xmlns:r="http://schemas.openxmlformats.org/officeDocument/2006/relationships" xmlns:p="http://schemas.openxmlformats.org/presentationml/2006/main">
   <p:cSld>
     <p:spTree>
@@ -4495,90 +4935,6 @@
 </p:sld>
 </file>
 
-<file path=ppt/slides/slide8.xml><?xml version="1.0" encoding="utf-8"?>
-<p:sld xmlns:a="http://schemas.openxmlformats.org/drawingml/2006/main" xmlns:r="http://schemas.openxmlformats.org/officeDocument/2006/relationships" xmlns:p="http://schemas.openxmlformats.org/presentationml/2006/main">
-  <p:cSld>
-    <p:spTree>
-      <p:nvGrpSpPr>
-        <p:cNvPr id="1" name=""/>
-        <p:cNvGrpSpPr/>
-        <p:nvPr/>
-      </p:nvGrpSpPr>
-      <p:grpSpPr>
-        <a:xfrm>
-          <a:off x="0" y="0"/>
-          <a:ext cx="0" cy="0"/>
-          <a:chOff x="0" y="0"/>
-          <a:chExt cx="0" cy="0"/>
-        </a:xfrm>
-      </p:grpSpPr>
-      <p:sp>
-        <p:nvSpPr>
-          <p:cNvPr id="2" name="Title 1">
-            <a:extLst>
-              <a:ext uri="{FF2B5EF4-FFF2-40B4-BE49-F238E27FC236}">
-                <a16:creationId xmlns:a16="http://schemas.microsoft.com/office/drawing/2014/main" id="{0ABDA52D-1056-4DB9-9B30-FCCEA3009EA9}"/>
-              </a:ext>
-            </a:extLst>
-          </p:cNvPr>
-          <p:cNvSpPr>
-            <a:spLocks noGrp="1"/>
-          </p:cNvSpPr>
-          <p:nvPr>
-            <p:ph type="title"/>
-          </p:nvPr>
-        </p:nvSpPr>
-        <p:spPr/>
-        <p:txBody>
-          <a:bodyPr/>
-          <a:lstStyle/>
-          <a:p>
-            <a:r>
-              <a:rPr lang="fr-FR" dirty="0"/>
-              <a:t>Stratégies</a:t>
-            </a:r>
-            <a:endParaRPr lang="en-US" dirty="0"/>
-          </a:p>
-        </p:txBody>
-      </p:sp>
-      <p:sp>
-        <p:nvSpPr>
-          <p:cNvPr id="3" name="Content Placeholder 2">
-            <a:extLst>
-              <a:ext uri="{FF2B5EF4-FFF2-40B4-BE49-F238E27FC236}">
-                <a16:creationId xmlns:a16="http://schemas.microsoft.com/office/drawing/2014/main" id="{B9D697F1-7132-4218-9A02-891537714431}"/>
-              </a:ext>
-            </a:extLst>
-          </p:cNvPr>
-          <p:cNvSpPr>
-            <a:spLocks noGrp="1"/>
-          </p:cNvSpPr>
-          <p:nvPr>
-            <p:ph idx="1"/>
-          </p:nvPr>
-        </p:nvSpPr>
-        <p:spPr/>
-        <p:txBody>
-          <a:bodyPr/>
-          <a:lstStyle/>
-          <a:p>
-            <a:endParaRPr lang="en-US" dirty="0"/>
-          </a:p>
-        </p:txBody>
-      </p:sp>
-    </p:spTree>
-    <p:extLst>
-      <p:ext uri="{BB962C8B-B14F-4D97-AF65-F5344CB8AC3E}">
-        <p14:creationId xmlns:p14="http://schemas.microsoft.com/office/powerpoint/2010/main" val="4045546859"/>
-      </p:ext>
-    </p:extLst>
-  </p:cSld>
-  <p:clrMapOvr>
-    <a:masterClrMapping/>
-  </p:clrMapOvr>
-</p:sld>
-</file>
-
 <file path=ppt/slides/slide9.xml><?xml version="1.0" encoding="utf-8"?>
 <p:sld xmlns:a="http://schemas.openxmlformats.org/drawingml/2006/main" xmlns:r="http://schemas.openxmlformats.org/officeDocument/2006/relationships" xmlns:p="http://schemas.openxmlformats.org/presentationml/2006/main">
   <p:cSld>
@@ -4601,7 +4957,7 @@
           <p:cNvPr id="2" name="Title 1">
             <a:extLst>
               <a:ext uri="{FF2B5EF4-FFF2-40B4-BE49-F238E27FC236}">
-                <a16:creationId xmlns:a16="http://schemas.microsoft.com/office/drawing/2014/main" id="{8799B785-EEBE-49C4-AB80-AC77F7A85E20}"/>
+                <a16:creationId xmlns:a16="http://schemas.microsoft.com/office/drawing/2014/main" id="{0ABDA52D-1056-4DB9-9B30-FCCEA3009EA9}"/>
               </a:ext>
             </a:extLst>
           </p:cNvPr>
@@ -4619,7 +4975,7 @@
           <a:p>
             <a:r>
               <a:rPr lang="fr-FR" dirty="0"/>
-              <a:t>Psychologie</a:t>
+              <a:t>Stratégies</a:t>
             </a:r>
             <a:endParaRPr lang="en-US" dirty="0"/>
           </a:p>
@@ -4630,7 +4986,7 @@
           <p:cNvPr id="3" name="Content Placeholder 2">
             <a:extLst>
               <a:ext uri="{FF2B5EF4-FFF2-40B4-BE49-F238E27FC236}">
-                <a16:creationId xmlns:a16="http://schemas.microsoft.com/office/drawing/2014/main" id="{EDA62261-4CE3-4393-9DEA-A5C83C80C12E}"/>
+                <a16:creationId xmlns:a16="http://schemas.microsoft.com/office/drawing/2014/main" id="{B9D697F1-7132-4218-9A02-891537714431}"/>
               </a:ext>
             </a:extLst>
           </p:cNvPr>
@@ -4646,14 +5002,42 @@
           <a:bodyPr/>
           <a:lstStyle/>
           <a:p>
-            <a:endParaRPr lang="en-US"/>
+            <a:r>
+              <a:rPr lang="fr-FR" dirty="0"/>
+              <a:t>Analyse technique</a:t>
+            </a:r>
+          </a:p>
+          <a:p>
+            <a:r>
+              <a:rPr lang="fr-FR" dirty="0"/>
+              <a:t>Indicateurs</a:t>
+            </a:r>
+          </a:p>
+          <a:p>
+            <a:r>
+              <a:rPr lang="fr-FR" dirty="0"/>
+              <a:t>Analyse fondamentale</a:t>
+            </a:r>
+          </a:p>
+          <a:p>
+            <a:r>
+              <a:rPr lang="fr-FR" dirty="0"/>
+              <a:t>News</a:t>
+            </a:r>
+          </a:p>
+          <a:p>
+            <a:r>
+              <a:rPr lang="fr-FR" dirty="0" err="1"/>
+              <a:t>Contrarian</a:t>
+            </a:r>
+            <a:endParaRPr lang="en-US" dirty="0"/>
           </a:p>
         </p:txBody>
       </p:sp>
     </p:spTree>
     <p:extLst>
       <p:ext uri="{BB962C8B-B14F-4D97-AF65-F5344CB8AC3E}">
-        <p14:creationId xmlns:p14="http://schemas.microsoft.com/office/powerpoint/2010/main" val="2971414286"/>
+        <p14:creationId xmlns:p14="http://schemas.microsoft.com/office/powerpoint/2010/main" val="4045546859"/>
       </p:ext>
     </p:extLst>
   </p:cSld>

</xml_diff>